<commit_message>
alterações na ordem da aula para garantir que todos os alunos terão tudo instalado
</commit_message>
<xml_diff>
--- a/exemplos_de_aula/01-rmarkdown-ppt/01-rmarkdown-ppt.pptx
+++ b/exemplos_de_aula/01-rmarkdown-ppt/01-rmarkdown-ppt.pptx
@@ -5901,31 +5901,31 @@
           <a:bodyPr/>
           <a:lstStyle/>
           <a:p>
-            <a:pPr lvl="0" marL="1270000" indent="0">
+            <a:pPr lvl="0" indent="0">
               <a:buNone/>
             </a:pPr>
             <a:r>
-              <a:rPr sz="1800" b="1">
+              <a:rPr>
                 <a:solidFill>
-                  <a:srgbClr val="007020"/>
+                  <a:srgbClr val="06287E"/>
                 </a:solidFill>
                 <a:latin typeface="Courier"/>
               </a:rPr>
               <a:t>summary</a:t>
             </a:r>
             <a:r>
-              <a:rPr sz="1800">
+              <a:rPr>
                 <a:latin typeface="Courier"/>
               </a:rPr>
               <a:t>(cars)</a:t>
             </a:r>
           </a:p>
           <a:p>
-            <a:pPr lvl="0" marL="1270000" indent="0">
+            <a:pPr lvl="0" indent="0">
               <a:buNone/>
             </a:pPr>
             <a:r>
-              <a:rPr sz="1800">
+              <a:rPr>
                 <a:latin typeface="Courier"/>
               </a:rPr>
               <a:t>##      speed           dist       

</xml_diff>